<commit_message>
Add data source in ppt
</commit_message>
<xml_diff>
--- a/GENDER AND AGE DETECTION.pptx
+++ b/GENDER AND AGE DETECTION.pptx
@@ -11285,6 +11285,17 @@
               <a:t>The images all vary greatly in age for both genders.</a:t>
             </a:r>
           </a:p>
+          <a:p>
+            <a:r>
+              <a:rPr lang="en-IN" dirty="0"/>
+              <a:t>The data for this project have been sourced from </a:t>
+            </a:r>
+            <a:r>
+              <a:rPr lang="en-IN" dirty="0" err="1"/>
+              <a:t>kagel</a:t>
+            </a:r>
+            <a:endParaRPr lang="en-IN" dirty="0"/>
+          </a:p>
         </p:txBody>
       </p:sp>
     </p:spTree>

</xml_diff>